<commit_message>
move image slides for clarity
</commit_message>
<xml_diff>
--- a/Team3: Matelinguistica.pptx
+++ b/Team3: Matelinguistica.pptx
@@ -11,9 +11,9 @@
     <p:sldId id="256" r:id="rId2"/>
     <p:sldId id="257" r:id="rId3"/>
     <p:sldId id="258" r:id="rId4"/>
-    <p:sldId id="259" r:id="rId5"/>
-    <p:sldId id="262" r:id="rId6"/>
-    <p:sldId id="263" r:id="rId7"/>
+    <p:sldId id="262" r:id="rId5"/>
+    <p:sldId id="263" r:id="rId6"/>
+    <p:sldId id="259" r:id="rId7"/>
     <p:sldId id="260" r:id="rId8"/>
     <p:sldId id="261" r:id="rId9"/>
   </p:sldIdLst>
@@ -3659,6 +3659,13 @@
   <p:clrMapOvr>
     <a:masterClrMapping/>
   </p:clrMapOvr>
+  <p:timing>
+    <p:tnLst>
+      <p:par>
+        <p:cTn id="1" dur="indefinite" restart="never" nodeType="tmRoot"/>
+      </p:par>
+    </p:tnLst>
+  </p:timing>
 </p:sld>
 </file>
 
@@ -3824,6 +3831,13 @@
   <p:clrMapOvr>
     <a:masterClrMapping/>
   </p:clrMapOvr>
+  <p:timing>
+    <p:tnLst>
+      <p:par>
+        <p:cTn id="1" dur="indefinite" restart="never" nodeType="tmRoot"/>
+      </p:par>
+    </p:tnLst>
+  </p:timing>
 </p:sld>
 </file>
 
@@ -4097,10 +4111,295 @@
   <p:clrMapOvr>
     <a:masterClrMapping/>
   </p:clrMapOvr>
+  <p:timing>
+    <p:tnLst>
+      <p:par>
+        <p:cTn id="1" dur="indefinite" restart="never" nodeType="tmRoot"/>
+      </p:par>
+    </p:tnLst>
+  </p:timing>
 </p:sld>
 </file>
 
 <file path=ppt/slides/slide4.xml><?xml version="1.0" encoding="utf-8"?>
+<p:sld xmlns:a="http://schemas.openxmlformats.org/drawingml/2006/main" xmlns:r="http://schemas.openxmlformats.org/officeDocument/2006/relationships" xmlns:p="http://schemas.openxmlformats.org/presentationml/2006/main">
+  <p:cSld>
+    <p:spTree>
+      <p:nvGrpSpPr>
+        <p:cNvPr id="1" name=""/>
+        <p:cNvGrpSpPr/>
+        <p:nvPr/>
+      </p:nvGrpSpPr>
+      <p:grpSpPr>
+        <a:xfrm>
+          <a:off x="0" y="0"/>
+          <a:ext cx="0" cy="0"/>
+          <a:chOff x="0" y="0"/>
+          <a:chExt cx="0" cy="0"/>
+        </a:xfrm>
+      </p:grpSpPr>
+      <p:sp>
+        <p:nvSpPr>
+          <p:cNvPr id="2" name="Title 1"/>
+          <p:cNvSpPr>
+            <a:spLocks noGrp="1"/>
+          </p:cNvSpPr>
+          <p:nvPr>
+            <p:ph type="title"/>
+          </p:nvPr>
+        </p:nvSpPr>
+        <p:spPr>
+          <a:xfrm>
+            <a:off x="466332" y="118309"/>
+            <a:ext cx="4879443" cy="1217354"/>
+          </a:xfrm>
+        </p:spPr>
+        <p:txBody>
+          <a:bodyPr>
+            <a:normAutofit/>
+          </a:bodyPr>
+          <a:lstStyle/>
+          <a:p>
+            <a:r>
+              <a:rPr lang="en-US" sz="2800" smtClean="0"/>
+              <a:t>Data Frame Input to Word2Vec</a:t>
+            </a:r>
+            <a:endParaRPr lang="en-US" sz="2800" dirty="0"/>
+          </a:p>
+        </p:txBody>
+      </p:sp>
+      <p:pic>
+        <p:nvPicPr>
+          <p:cNvPr id="6" name="Picture 5"/>
+          <p:cNvPicPr>
+            <a:picLocks noChangeAspect="1"/>
+          </p:cNvPicPr>
+          <p:nvPr/>
+        </p:nvPicPr>
+        <p:blipFill>
+          <a:blip r:embed="rId2">
+            <a:extLst>
+              <a:ext uri="{28A0092B-C50C-407E-A947-70E740481C1C}">
+                <a14:useLocalDpi xmlns:a14="http://schemas.microsoft.com/office/drawing/2010/main" val="0"/>
+              </a:ext>
+            </a:extLst>
+          </a:blip>
+          <a:stretch>
+            <a:fillRect/>
+          </a:stretch>
+        </p:blipFill>
+        <p:spPr>
+          <a:xfrm>
+            <a:off x="838788" y="1349934"/>
+            <a:ext cx="3728129" cy="5548843"/>
+          </a:xfrm>
+          <a:prstGeom prst="rect">
+            <a:avLst/>
+          </a:prstGeom>
+        </p:spPr>
+      </p:pic>
+      <p:sp>
+        <p:nvSpPr>
+          <p:cNvPr id="8" name="Title 1"/>
+          <p:cNvSpPr txBox="1">
+            <a:spLocks/>
+          </p:cNvSpPr>
+          <p:nvPr/>
+        </p:nvSpPr>
+        <p:spPr>
+          <a:xfrm>
+            <a:off x="6115493" y="168002"/>
+            <a:ext cx="5966637" cy="1293554"/>
+          </a:xfrm>
+          <a:prstGeom prst="rect">
+            <a:avLst/>
+          </a:prstGeom>
+        </p:spPr>
+        <p:txBody>
+          <a:bodyPr vert="horz" lIns="91440" tIns="45720" rIns="91440" bIns="45720" rtlCol="0" anchor="ctr">
+            <a:normAutofit/>
+          </a:bodyPr>
+          <a:lstStyle>
+            <a:lvl1pPr algn="l" defTabSz="914400" rtl="0" eaLnBrk="1" latinLnBrk="0" hangingPunct="1">
+              <a:lnSpc>
+                <a:spcPct val="90000"/>
+              </a:lnSpc>
+              <a:spcBef>
+                <a:spcPct val="0"/>
+              </a:spcBef>
+              <a:buNone/>
+              <a:defRPr sz="4400" kern="1200">
+                <a:solidFill>
+                  <a:schemeClr val="tx1"/>
+                </a:solidFill>
+                <a:latin typeface="+mj-lt"/>
+                <a:ea typeface="+mj-ea"/>
+                <a:cs typeface="+mj-cs"/>
+              </a:defRPr>
+            </a:lvl1pPr>
+          </a:lstStyle>
+          <a:p>
+            <a:r>
+              <a:rPr lang="en-US" sz="2800" dirty="0" smtClean="0"/>
+              <a:t>K-Means Clustering of words with PCA</a:t>
+            </a:r>
+          </a:p>
+          <a:p>
+            <a:r>
+              <a:rPr lang="en-US" sz="2800" dirty="0" smtClean="0"/>
+              <a:t>k = 100 clusters</a:t>
+            </a:r>
+            <a:endParaRPr lang="en-US" sz="2800" dirty="0"/>
+          </a:p>
+        </p:txBody>
+      </p:sp>
+      <p:pic>
+        <p:nvPicPr>
+          <p:cNvPr id="9" name="Picture 8"/>
+          <p:cNvPicPr>
+            <a:picLocks noChangeAspect="1"/>
+          </p:cNvPicPr>
+          <p:nvPr/>
+        </p:nvPicPr>
+        <p:blipFill>
+          <a:blip r:embed="rId3">
+            <a:extLst>
+              <a:ext uri="{28A0092B-C50C-407E-A947-70E740481C1C}">
+                <a14:useLocalDpi xmlns:a14="http://schemas.microsoft.com/office/drawing/2010/main" val="0"/>
+              </a:ext>
+            </a:extLst>
+          </a:blip>
+          <a:stretch>
+            <a:fillRect/>
+          </a:stretch>
+        </p:blipFill>
+        <p:spPr>
+          <a:xfrm>
+            <a:off x="5336635" y="1335663"/>
+            <a:ext cx="6729339" cy="5520299"/>
+          </a:xfrm>
+          <a:prstGeom prst="rect">
+            <a:avLst/>
+          </a:prstGeom>
+        </p:spPr>
+      </p:pic>
+    </p:spTree>
+    <p:extLst>
+      <p:ext uri="{BB962C8B-B14F-4D97-AF65-F5344CB8AC3E}">
+        <p14:creationId xmlns:p14="http://schemas.microsoft.com/office/powerpoint/2010/main" val="1860784889"/>
+      </p:ext>
+    </p:extLst>
+  </p:cSld>
+  <p:clrMapOvr>
+    <a:masterClrMapping/>
+  </p:clrMapOvr>
+  <p:timing>
+    <p:tnLst>
+      <p:par>
+        <p:cTn id="1" dur="indefinite" restart="never" nodeType="tmRoot"/>
+      </p:par>
+    </p:tnLst>
+  </p:timing>
+</p:sld>
+</file>
+
+<file path=ppt/slides/slide5.xml><?xml version="1.0" encoding="utf-8"?>
+<p:sld xmlns:a="http://schemas.openxmlformats.org/drawingml/2006/main" xmlns:r="http://schemas.openxmlformats.org/officeDocument/2006/relationships" xmlns:p="http://schemas.openxmlformats.org/presentationml/2006/main">
+  <p:cSld>
+    <p:spTree>
+      <p:nvGrpSpPr>
+        <p:cNvPr id="1" name=""/>
+        <p:cNvGrpSpPr/>
+        <p:nvPr/>
+      </p:nvGrpSpPr>
+      <p:grpSpPr>
+        <a:xfrm>
+          <a:off x="0" y="0"/>
+          <a:ext cx="0" cy="0"/>
+          <a:chOff x="0" y="0"/>
+          <a:chExt cx="0" cy="0"/>
+        </a:xfrm>
+      </p:grpSpPr>
+      <p:sp>
+        <p:nvSpPr>
+          <p:cNvPr id="2" name="Title 1"/>
+          <p:cNvSpPr>
+            <a:spLocks noGrp="1"/>
+          </p:cNvSpPr>
+          <p:nvPr>
+            <p:ph type="title"/>
+          </p:nvPr>
+        </p:nvSpPr>
+        <p:spPr>
+          <a:xfrm>
+            <a:off x="838200" y="405765"/>
+            <a:ext cx="10515600" cy="1325563"/>
+          </a:xfrm>
+        </p:spPr>
+        <p:txBody>
+          <a:bodyPr/>
+          <a:lstStyle/>
+          <a:p>
+            <a:pPr algn="ctr"/>
+            <a:r>
+              <a:rPr lang="en-US" dirty="0" smtClean="0"/>
+              <a:t>Decision Tree</a:t>
+            </a:r>
+            <a:endParaRPr lang="en-US" dirty="0"/>
+          </a:p>
+        </p:txBody>
+      </p:sp>
+      <p:pic>
+        <p:nvPicPr>
+          <p:cNvPr id="5" name="Picture 4"/>
+          <p:cNvPicPr>
+            <a:picLocks noChangeAspect="1"/>
+          </p:cNvPicPr>
+          <p:nvPr/>
+        </p:nvPicPr>
+        <p:blipFill>
+          <a:blip r:embed="rId2">
+            <a:extLst>
+              <a:ext uri="{28A0092B-C50C-407E-A947-70E740481C1C}">
+                <a14:useLocalDpi xmlns:a14="http://schemas.microsoft.com/office/drawing/2010/main" val="0"/>
+              </a:ext>
+            </a:extLst>
+          </a:blip>
+          <a:stretch>
+            <a:fillRect/>
+          </a:stretch>
+        </p:blipFill>
+        <p:spPr>
+          <a:xfrm>
+            <a:off x="2133600" y="1552413"/>
+            <a:ext cx="7924800" cy="5305587"/>
+          </a:xfrm>
+          <a:prstGeom prst="rect">
+            <a:avLst/>
+          </a:prstGeom>
+        </p:spPr>
+      </p:pic>
+    </p:spTree>
+    <p:extLst>
+      <p:ext uri="{BB962C8B-B14F-4D97-AF65-F5344CB8AC3E}">
+        <p14:creationId xmlns:p14="http://schemas.microsoft.com/office/powerpoint/2010/main" val="1362897135"/>
+      </p:ext>
+    </p:extLst>
+  </p:cSld>
+  <p:clrMapOvr>
+    <a:masterClrMapping/>
+  </p:clrMapOvr>
+  <p:timing>
+    <p:tnLst>
+      <p:par>
+        <p:cTn id="1" dur="indefinite" restart="never" nodeType="tmRoot"/>
+      </p:par>
+    </p:tnLst>
+  </p:timing>
+</p:sld>
+</file>
+
+<file path=ppt/slides/slide6.xml><?xml version="1.0" encoding="utf-8"?>
 <p:sld xmlns:a="http://schemas.openxmlformats.org/drawingml/2006/main" xmlns:r="http://schemas.openxmlformats.org/officeDocument/2006/relationships" xmlns:p="http://schemas.openxmlformats.org/presentationml/2006/main">
   <p:cSld>
     <p:spTree>
@@ -4253,270 +4552,13 @@
   <p:clrMapOvr>
     <a:masterClrMapping/>
   </p:clrMapOvr>
-</p:sld>
-</file>
-
-<file path=ppt/slides/slide5.xml><?xml version="1.0" encoding="utf-8"?>
-<p:sld xmlns:a="http://schemas.openxmlformats.org/drawingml/2006/main" xmlns:r="http://schemas.openxmlformats.org/officeDocument/2006/relationships" xmlns:p="http://schemas.openxmlformats.org/presentationml/2006/main">
-  <p:cSld>
-    <p:spTree>
-      <p:nvGrpSpPr>
-        <p:cNvPr id="1" name=""/>
-        <p:cNvGrpSpPr/>
-        <p:nvPr/>
-      </p:nvGrpSpPr>
-      <p:grpSpPr>
-        <a:xfrm>
-          <a:off x="0" y="0"/>
-          <a:ext cx="0" cy="0"/>
-          <a:chOff x="0" y="0"/>
-          <a:chExt cx="0" cy="0"/>
-        </a:xfrm>
-      </p:grpSpPr>
-      <p:sp>
-        <p:nvSpPr>
-          <p:cNvPr id="2" name="Title 1"/>
-          <p:cNvSpPr>
-            <a:spLocks noGrp="1"/>
-          </p:cNvSpPr>
-          <p:nvPr>
-            <p:ph type="title"/>
-          </p:nvPr>
-        </p:nvSpPr>
-        <p:spPr>
-          <a:xfrm>
-            <a:off x="466332" y="118309"/>
-            <a:ext cx="4879443" cy="1217354"/>
-          </a:xfrm>
-        </p:spPr>
-        <p:txBody>
-          <a:bodyPr>
-            <a:normAutofit/>
-          </a:bodyPr>
-          <a:lstStyle/>
-          <a:p>
-            <a:r>
-              <a:rPr lang="en-US" sz="2800" smtClean="0"/>
-              <a:t>Data Frame Input to Word2Vec</a:t>
-            </a:r>
-            <a:endParaRPr lang="en-US" sz="2800" dirty="0"/>
-          </a:p>
-        </p:txBody>
-      </p:sp>
-      <p:pic>
-        <p:nvPicPr>
-          <p:cNvPr id="6" name="Picture 5"/>
-          <p:cNvPicPr>
-            <a:picLocks noChangeAspect="1"/>
-          </p:cNvPicPr>
-          <p:nvPr/>
-        </p:nvPicPr>
-        <p:blipFill>
-          <a:blip r:embed="rId2">
-            <a:extLst>
-              <a:ext uri="{28A0092B-C50C-407E-A947-70E740481C1C}">
-                <a14:useLocalDpi xmlns:a14="http://schemas.microsoft.com/office/drawing/2010/main" val="0"/>
-              </a:ext>
-            </a:extLst>
-          </a:blip>
-          <a:stretch>
-            <a:fillRect/>
-          </a:stretch>
-        </p:blipFill>
-        <p:spPr>
-          <a:xfrm>
-            <a:off x="838788" y="1349934"/>
-            <a:ext cx="3728129" cy="5548843"/>
-          </a:xfrm>
-          <a:prstGeom prst="rect">
-            <a:avLst/>
-          </a:prstGeom>
-        </p:spPr>
-      </p:pic>
-      <p:sp>
-        <p:nvSpPr>
-          <p:cNvPr id="8" name="Title 1"/>
-          <p:cNvSpPr txBox="1">
-            <a:spLocks/>
-          </p:cNvSpPr>
-          <p:nvPr/>
-        </p:nvSpPr>
-        <p:spPr>
-          <a:xfrm>
-            <a:off x="6115493" y="168002"/>
-            <a:ext cx="5966637" cy="1293554"/>
-          </a:xfrm>
-          <a:prstGeom prst="rect">
-            <a:avLst/>
-          </a:prstGeom>
-        </p:spPr>
-        <p:txBody>
-          <a:bodyPr vert="horz" lIns="91440" tIns="45720" rIns="91440" bIns="45720" rtlCol="0" anchor="ctr">
-            <a:normAutofit/>
-          </a:bodyPr>
-          <a:lstStyle>
-            <a:lvl1pPr algn="l" defTabSz="914400" rtl="0" eaLnBrk="1" latinLnBrk="0" hangingPunct="1">
-              <a:lnSpc>
-                <a:spcPct val="90000"/>
-              </a:lnSpc>
-              <a:spcBef>
-                <a:spcPct val="0"/>
-              </a:spcBef>
-              <a:buNone/>
-              <a:defRPr sz="4400" kern="1200">
-                <a:solidFill>
-                  <a:schemeClr val="tx1"/>
-                </a:solidFill>
-                <a:latin typeface="+mj-lt"/>
-                <a:ea typeface="+mj-ea"/>
-                <a:cs typeface="+mj-cs"/>
-              </a:defRPr>
-            </a:lvl1pPr>
-          </a:lstStyle>
-          <a:p>
-            <a:r>
-              <a:rPr lang="en-US" sz="2800" dirty="0" smtClean="0"/>
-              <a:t>K-Means Clustering of words with PCA</a:t>
-            </a:r>
-          </a:p>
-          <a:p>
-            <a:r>
-              <a:rPr lang="en-US" sz="2800" dirty="0" smtClean="0"/>
-              <a:t>k = 100 clusters</a:t>
-            </a:r>
-            <a:endParaRPr lang="en-US" sz="2800" dirty="0"/>
-          </a:p>
-        </p:txBody>
-      </p:sp>
-      <p:pic>
-        <p:nvPicPr>
-          <p:cNvPr id="9" name="Picture 8"/>
-          <p:cNvPicPr>
-            <a:picLocks noChangeAspect="1"/>
-          </p:cNvPicPr>
-          <p:nvPr/>
-        </p:nvPicPr>
-        <p:blipFill>
-          <a:blip r:embed="rId3">
-            <a:extLst>
-              <a:ext uri="{28A0092B-C50C-407E-A947-70E740481C1C}">
-                <a14:useLocalDpi xmlns:a14="http://schemas.microsoft.com/office/drawing/2010/main" val="0"/>
-              </a:ext>
-            </a:extLst>
-          </a:blip>
-          <a:stretch>
-            <a:fillRect/>
-          </a:stretch>
-        </p:blipFill>
-        <p:spPr>
-          <a:xfrm>
-            <a:off x="5336635" y="1335663"/>
-            <a:ext cx="6729339" cy="5520299"/>
-          </a:xfrm>
-          <a:prstGeom prst="rect">
-            <a:avLst/>
-          </a:prstGeom>
-        </p:spPr>
-      </p:pic>
-    </p:spTree>
-    <p:extLst>
-      <p:ext uri="{BB962C8B-B14F-4D97-AF65-F5344CB8AC3E}">
-        <p14:creationId xmlns:p14="http://schemas.microsoft.com/office/powerpoint/2010/main" val="1860784889"/>
-      </p:ext>
-    </p:extLst>
-  </p:cSld>
-  <p:clrMapOvr>
-    <a:masterClrMapping/>
-  </p:clrMapOvr>
-</p:sld>
-</file>
-
-<file path=ppt/slides/slide6.xml><?xml version="1.0" encoding="utf-8"?>
-<p:sld xmlns:a="http://schemas.openxmlformats.org/drawingml/2006/main" xmlns:r="http://schemas.openxmlformats.org/officeDocument/2006/relationships" xmlns:p="http://schemas.openxmlformats.org/presentationml/2006/main">
-  <p:cSld>
-    <p:spTree>
-      <p:nvGrpSpPr>
-        <p:cNvPr id="1" name=""/>
-        <p:cNvGrpSpPr/>
-        <p:nvPr/>
-      </p:nvGrpSpPr>
-      <p:grpSpPr>
-        <a:xfrm>
-          <a:off x="0" y="0"/>
-          <a:ext cx="0" cy="0"/>
-          <a:chOff x="0" y="0"/>
-          <a:chExt cx="0" cy="0"/>
-        </a:xfrm>
-      </p:grpSpPr>
-      <p:sp>
-        <p:nvSpPr>
-          <p:cNvPr id="2" name="Title 1"/>
-          <p:cNvSpPr>
-            <a:spLocks noGrp="1"/>
-          </p:cNvSpPr>
-          <p:nvPr>
-            <p:ph type="title"/>
-          </p:nvPr>
-        </p:nvSpPr>
-        <p:spPr>
-          <a:xfrm>
-            <a:off x="838200" y="405765"/>
-            <a:ext cx="10515600" cy="1325563"/>
-          </a:xfrm>
-        </p:spPr>
-        <p:txBody>
-          <a:bodyPr/>
-          <a:lstStyle/>
-          <a:p>
-            <a:pPr algn="ctr"/>
-            <a:r>
-              <a:rPr lang="en-US" dirty="0" smtClean="0"/>
-              <a:t>Decision Tree</a:t>
-            </a:r>
-            <a:endParaRPr lang="en-US" dirty="0"/>
-          </a:p>
-        </p:txBody>
-      </p:sp>
-      <p:pic>
-        <p:nvPicPr>
-          <p:cNvPr id="5" name="Picture 4"/>
-          <p:cNvPicPr>
-            <a:picLocks noChangeAspect="1"/>
-          </p:cNvPicPr>
-          <p:nvPr/>
-        </p:nvPicPr>
-        <p:blipFill>
-          <a:blip r:embed="rId2">
-            <a:extLst>
-              <a:ext uri="{28A0092B-C50C-407E-A947-70E740481C1C}">
-                <a14:useLocalDpi xmlns:a14="http://schemas.microsoft.com/office/drawing/2010/main" val="0"/>
-              </a:ext>
-            </a:extLst>
-          </a:blip>
-          <a:stretch>
-            <a:fillRect/>
-          </a:stretch>
-        </p:blipFill>
-        <p:spPr>
-          <a:xfrm>
-            <a:off x="2133600" y="1552413"/>
-            <a:ext cx="7924800" cy="5305587"/>
-          </a:xfrm>
-          <a:prstGeom prst="rect">
-            <a:avLst/>
-          </a:prstGeom>
-        </p:spPr>
-      </p:pic>
-    </p:spTree>
-    <p:extLst>
-      <p:ext uri="{BB962C8B-B14F-4D97-AF65-F5344CB8AC3E}">
-        <p14:creationId xmlns:p14="http://schemas.microsoft.com/office/powerpoint/2010/main" val="1362897135"/>
-      </p:ext>
-    </p:extLst>
-  </p:cSld>
-  <p:clrMapOvr>
-    <a:masterClrMapping/>
-  </p:clrMapOvr>
+  <p:timing>
+    <p:tnLst>
+      <p:par>
+        <p:cTn id="1" dur="indefinite" restart="never" nodeType="tmRoot"/>
+      </p:par>
+    </p:tnLst>
+  </p:timing>
 </p:sld>
 </file>
 
@@ -4612,6 +4654,13 @@
   <p:clrMapOvr>
     <a:masterClrMapping/>
   </p:clrMapOvr>
+  <p:timing>
+    <p:tnLst>
+      <p:par>
+        <p:cTn id="1" dur="indefinite" restart="never" nodeType="tmRoot"/>
+      </p:par>
+    </p:tnLst>
+  </p:timing>
 </p:sld>
 </file>
 
@@ -4764,6 +4813,13 @@
   <p:clrMapOvr>
     <a:masterClrMapping/>
   </p:clrMapOvr>
+  <p:timing>
+    <p:tnLst>
+      <p:par>
+        <p:cTn id="1" dur="indefinite" restart="never" nodeType="tmRoot"/>
+      </p:par>
+    </p:tnLst>
+  </p:timing>
 </p:sld>
 </file>
 

</xml_diff>